<commit_message>
badges reference changed, invoke-build ref added
</commit_message>
<xml_diff>
--- a/CI_CD_with PS.pptx
+++ b/CI_CD_with PS.pptx
@@ -6176,8 +6176,8 @@
         </p:nvSpPr>
         <p:spPr>
           <a:xfrm>
-            <a:off x="3434502" y="5165036"/>
-            <a:ext cx="1349165" cy="561580"/>
+            <a:off x="3434502" y="5165037"/>
+            <a:ext cx="1349165" cy="561579"/>
           </a:xfrm>
           <a:prstGeom prst="rect">
             <a:avLst/>
@@ -6287,7 +6287,7 @@
         <p:spPr>
           <a:xfrm>
             <a:off x="10206550" y="2946752"/>
-            <a:ext cx="859457" cy="1"/>
+            <a:ext cx="859456" cy="1"/>
           </a:xfrm>
           <a:prstGeom prst="line">
             <a:avLst/>
@@ -6992,7 +6992,7 @@
             <a:avLst/>
           </a:prstGeom>
           <a:blipFill>
-            <a:blip r:embed="rId3"/>
+            <a:blip r:embed="rId4"/>
           </a:blipFill>
           <a:ln w="12700">
             <a:miter lim="400000"/>
@@ -7040,8 +7040,8 @@
         </p:nvSpPr>
         <p:spPr>
           <a:xfrm>
-            <a:off x="9005412" y="5165036"/>
-            <a:ext cx="1270001" cy="561580"/>
+            <a:off x="9005412" y="5165037"/>
+            <a:ext cx="1270001" cy="561579"/>
           </a:xfrm>
           <a:prstGeom prst="rect">
             <a:avLst/>
@@ -7315,7 +7315,7 @@
         </p:nvSpPr>
         <p:spPr>
           <a:xfrm>
-            <a:off x="8604299" y="8631051"/>
+            <a:off x="8604299" y="8631052"/>
             <a:ext cx="1270001" cy="859457"/>
           </a:xfrm>
           <a:prstGeom prst="rect">
@@ -7370,7 +7370,7 @@
         </p:nvSpPr>
         <p:spPr>
           <a:xfrm>
-            <a:off x="9892549" y="8631051"/>
+            <a:off x="9892549" y="8631052"/>
             <a:ext cx="2475993" cy="444501"/>
           </a:xfrm>
           <a:prstGeom prst="rect">
@@ -7816,8 +7816,8 @@
         </p:nvSpPr>
         <p:spPr>
           <a:xfrm>
-            <a:off x="3387598" y="8947149"/>
-            <a:ext cx="5818124" cy="342901"/>
+            <a:off x="3387597" y="8947149"/>
+            <a:ext cx="5818125" cy="342901"/>
           </a:xfrm>
           <a:prstGeom prst="rect">
             <a:avLst/>
@@ -8236,7 +8236,7 @@
         <p:spPr>
           <a:xfrm>
             <a:off x="4610623" y="2441641"/>
-            <a:ext cx="1448474" cy="406401"/>
+            <a:ext cx="1448475" cy="406401"/>
           </a:xfrm>
           <a:prstGeom prst="rect">
             <a:avLst/>
@@ -8524,8 +8524,8 @@
         </p:nvSpPr>
         <p:spPr>
           <a:xfrm>
-            <a:off x="1602704" y="4552716"/>
-            <a:ext cx="1382141" cy="304801"/>
+            <a:off x="1602704" y="4552715"/>
+            <a:ext cx="1382142" cy="304801"/>
           </a:xfrm>
           <a:prstGeom prst="rect">
             <a:avLst/>
@@ -8613,7 +8613,7 @@
         <p:spPr>
           <a:xfrm>
             <a:off x="3100157" y="3334820"/>
-            <a:ext cx="1448475" cy="312044"/>
+            <a:ext cx="1448474" cy="312044"/>
           </a:xfrm>
           <a:prstGeom prst="rect">
             <a:avLst/>
@@ -8748,7 +8748,7 @@
         <p:spPr>
           <a:xfrm>
             <a:off x="3100157" y="2977454"/>
-            <a:ext cx="1448475" cy="312044"/>
+            <a:ext cx="1448474" cy="312044"/>
           </a:xfrm>
           <a:prstGeom prst="rect">
             <a:avLst/>
@@ -8967,8 +8967,8 @@
         </p:nvSpPr>
         <p:spPr>
           <a:xfrm>
-            <a:off x="4637443" y="3335163"/>
-            <a:ext cx="1448475" cy="312044"/>
+            <a:off x="4637444" y="3335163"/>
+            <a:ext cx="1448474" cy="312044"/>
           </a:xfrm>
           <a:prstGeom prst="rect">
             <a:avLst/>
@@ -9012,8 +9012,8 @@
         </p:nvSpPr>
         <p:spPr>
           <a:xfrm>
-            <a:off x="4637443" y="4070075"/>
-            <a:ext cx="1448475" cy="312044"/>
+            <a:off x="4637444" y="4070075"/>
+            <a:ext cx="1448474" cy="312044"/>
           </a:xfrm>
           <a:prstGeom prst="rect">
             <a:avLst/>
@@ -9057,8 +9057,8 @@
         </p:nvSpPr>
         <p:spPr>
           <a:xfrm>
-            <a:off x="4640592" y="3696832"/>
-            <a:ext cx="1460488" cy="312044"/>
+            <a:off x="4640591" y="3696832"/>
+            <a:ext cx="1460489" cy="312044"/>
           </a:xfrm>
           <a:prstGeom prst="rect">
             <a:avLst/>
@@ -9102,8 +9102,8 @@
         </p:nvSpPr>
         <p:spPr>
           <a:xfrm>
-            <a:off x="4624743" y="2969493"/>
-            <a:ext cx="1448475" cy="312044"/>
+            <a:off x="4624744" y="2969493"/>
+            <a:ext cx="1448474" cy="312044"/>
           </a:xfrm>
           <a:prstGeom prst="rect">
             <a:avLst/>
@@ -9233,8 +9233,8 @@
         </p:nvSpPr>
         <p:spPr>
           <a:xfrm>
-            <a:off x="6116448" y="2969493"/>
-            <a:ext cx="1448474" cy="312044"/>
+            <a:off x="6116447" y="2969493"/>
+            <a:ext cx="1448475" cy="312044"/>
           </a:xfrm>
           <a:prstGeom prst="rect">
             <a:avLst/>
@@ -9455,7 +9455,7 @@
         <p:spPr>
           <a:xfrm>
             <a:off x="7653307" y="3722773"/>
-            <a:ext cx="1460489" cy="312044"/>
+            <a:ext cx="1460488" cy="312044"/>
           </a:xfrm>
           <a:prstGeom prst="rect">
             <a:avLst/>
@@ -9544,8 +9544,8 @@
         </p:nvSpPr>
         <p:spPr>
           <a:xfrm>
-            <a:off x="7666333" y="4857458"/>
-            <a:ext cx="1378171" cy="485429"/>
+            <a:off x="7666332" y="4857458"/>
+            <a:ext cx="1378172" cy="485429"/>
           </a:xfrm>
           <a:prstGeom prst="rect">
             <a:avLst/>
@@ -9631,7 +9631,7 @@
         <p:spPr>
           <a:xfrm>
             <a:off x="7723463" y="5022493"/>
-            <a:ext cx="820104" cy="330201"/>
+            <a:ext cx="820103" cy="330201"/>
           </a:xfrm>
           <a:prstGeom prst="rect">
             <a:avLst/>
@@ -9774,7 +9774,7 @@
         </p:nvSpPr>
         <p:spPr>
           <a:xfrm>
-            <a:off x="7659314" y="4096016"/>
+            <a:off x="7659314" y="4096015"/>
             <a:ext cx="1448474" cy="312044"/>
           </a:xfrm>
           <a:prstGeom prst="rect">
@@ -9820,7 +9820,7 @@
         <p:spPr>
           <a:xfrm>
             <a:off x="11482820" y="2447294"/>
-            <a:ext cx="1403571" cy="406401"/>
+            <a:ext cx="1403572" cy="406401"/>
           </a:xfrm>
           <a:prstGeom prst="rect">
             <a:avLst/>
@@ -9875,7 +9875,7 @@
         <p:spPr>
           <a:xfrm>
             <a:off x="11492059" y="3355706"/>
-            <a:ext cx="1385093" cy="312044"/>
+            <a:ext cx="1385093" cy="312043"/>
           </a:xfrm>
           <a:prstGeom prst="rect">
             <a:avLst/>
@@ -10009,7 +10009,7 @@
         </p:nvSpPr>
         <p:spPr>
           <a:xfrm>
-            <a:off x="9164002" y="2444627"/>
+            <a:off x="9164001" y="2444627"/>
             <a:ext cx="2247080" cy="406401"/>
           </a:xfrm>
           <a:prstGeom prst="rect">
@@ -10064,7 +10064,7 @@
         </p:nvSpPr>
         <p:spPr>
           <a:xfrm>
-            <a:off x="9171104" y="2968855"/>
+            <a:off x="9171103" y="2968855"/>
             <a:ext cx="2247080" cy="312044"/>
           </a:xfrm>
           <a:prstGeom prst="rect">
@@ -10109,8 +10109,8 @@
         </p:nvSpPr>
         <p:spPr>
           <a:xfrm>
-            <a:off x="9227502" y="4485349"/>
-            <a:ext cx="2592962" cy="711201"/>
+            <a:off x="9227501" y="4485349"/>
+            <a:ext cx="2592963" cy="711201"/>
           </a:xfrm>
           <a:prstGeom prst="rect">
             <a:avLst/>
@@ -10332,7 +10332,7 @@
         </p:nvSpPr>
         <p:spPr>
           <a:xfrm>
-            <a:off x="7681032" y="6172905"/>
+            <a:off x="7681032" y="6172906"/>
             <a:ext cx="1430870" cy="304801"/>
           </a:xfrm>
           <a:prstGeom prst="rect">
@@ -10374,7 +10374,7 @@
         </p:nvSpPr>
         <p:spPr>
           <a:xfrm>
-            <a:off x="7688543" y="6160205"/>
+            <a:off x="7688543" y="6160206"/>
             <a:ext cx="1330592" cy="330201"/>
           </a:xfrm>
           <a:prstGeom prst="rect">
@@ -10651,7 +10651,7 @@
         </p:nvSpPr>
         <p:spPr>
           <a:xfrm>
-            <a:off x="6581071" y="8675776"/>
+            <a:off x="6581071" y="8675775"/>
             <a:ext cx="6136666" cy="431801"/>
           </a:xfrm>
           <a:prstGeom prst="rect">
@@ -11876,7 +11876,7 @@
         <p:spPr>
           <a:xfrm>
             <a:off x="-38100" y="3961303"/>
-            <a:ext cx="13004801" cy="4112401"/>
+            <a:ext cx="13004801" cy="4112402"/>
           </a:xfrm>
           <a:prstGeom prst="rect">
             <a:avLst/>
@@ -11904,8 +11904,8 @@
         </p:blipFill>
         <p:spPr>
           <a:xfrm>
-            <a:off x="-12700" y="8139764"/>
-            <a:ext cx="13004801" cy="1354110"/>
+            <a:off x="-12700" y="8139765"/>
+            <a:ext cx="13004801" cy="1354109"/>
           </a:xfrm>
           <a:prstGeom prst="rect">
             <a:avLst/>
@@ -12008,7 +12008,17 @@
               </a:defRPr>
             </a:pPr>
             <a:r>
-              <a:t>My examples: </a:t>
+              <a:t>Invoke-build:</a:t>
+            </a:r>
+            <a:br/>
+            <a:r>
+              <a:rPr u="sng">
+                <a:solidFill>
+                  <a:schemeClr val="accent1"/>
+                </a:solidFill>
+                <a:hlinkClick r:id="rId2" invalidUrl="" action="" tgtFrame="" tooltip="" history="1" highlightClick="0" endSnd="0"/>
+              </a:rPr>
+              <a:t>https://github.com/nightroman/Invoke-Build</a:t>
             </a:r>
           </a:p>
           <a:p>
@@ -12030,14 +12040,10 @@
                 <a:sym typeface="Monaco"/>
               </a:defRPr>
             </a:pPr>
-            <a:r>
-              <a:rPr u="sng">
-                <a:solidFill>
-                  <a:schemeClr val="accent1"/>
-                </a:solidFill>
-                <a:hlinkClick r:id="rId2" invalidUrl="" action="" tgtFrame="" tooltip="" history="1" highlightClick="0" endSnd="0"/>
-              </a:rPr>
-              <a:t>https://github.com/ebrucucen/PSModules</a:t>
+            <a:br/>
+            <a:br/>
+            <a:r>
+              <a:t>My examples: </a:t>
             </a:r>
           </a:p>
           <a:p>
@@ -12066,7 +12072,7 @@
                 </a:solidFill>
                 <a:hlinkClick r:id="rId3" invalidUrl="" action="" tgtFrame="" tooltip="" history="1" highlightClick="0" endSnd="0"/>
               </a:rPr>
-              <a:t>https://ci.appveyor.com/project/ebrucucen/psmodules</a:t>
+              <a:t>https://github.com/ebrucucen/PSModules</a:t>
             </a:r>
           </a:p>
           <a:p>
@@ -12088,6 +12094,15 @@
                 <a:sym typeface="Monaco"/>
               </a:defRPr>
             </a:pPr>
+            <a:r>
+              <a:rPr u="sng">
+                <a:solidFill>
+                  <a:schemeClr val="accent1"/>
+                </a:solidFill>
+                <a:hlinkClick r:id="rId4" invalidUrl="" action="" tgtFrame="" tooltip="" history="1" highlightClick="0" endSnd="0"/>
+              </a:rPr>
+              <a:t>https://ci.appveyor.com/project/ebrucucen/psmodules</a:t>
+            </a:r>
           </a:p>
           <a:p>
             <a:pPr marL="0" indent="0" defTabSz="457200">
@@ -12108,9 +12123,6 @@
                 <a:sym typeface="Monaco"/>
               </a:defRPr>
             </a:pPr>
-            <a:r>
-              <a:t>How many badges?</a:t>
-            </a:r>
           </a:p>
           <a:p>
             <a:pPr marL="0" indent="0" defTabSz="457200">
@@ -12132,13 +12144,7 @@
               </a:defRPr>
             </a:pPr>
             <a:r>
-              <a:rPr u="sng">
-                <a:solidFill>
-                  <a:schemeClr val="accent1"/>
-                </a:solidFill>
-                <a:hlinkClick r:id="rId4" invalidUrl="" action="" tgtFrame="" tooltip="" history="1" highlightClick="0" endSnd="0"/>
-              </a:rPr>
-              <a:t>https://github.com/lvermeulen/Nanophone/blob/master/build/build.ps1</a:t>
+              <a:t>More github badges?</a:t>
             </a:r>
           </a:p>
           <a:p>
@@ -12160,6 +12166,15 @@
                 <a:sym typeface="Monaco"/>
               </a:defRPr>
             </a:pPr>
+            <a:r>
+              <a:rPr u="sng">
+                <a:solidFill>
+                  <a:schemeClr val="accent1"/>
+                </a:solidFill>
+                <a:hlinkClick r:id="rId5" invalidUrl="" action="" tgtFrame="" tooltip="" history="1" highlightClick="0" endSnd="0"/>
+              </a:rPr>
+              <a:t>https://shields.io</a:t>
+            </a:r>
           </a:p>
           <a:p>
             <a:pPr marL="0" indent="0" defTabSz="457200">
@@ -12180,9 +12195,6 @@
                 <a:sym typeface="Monaco"/>
               </a:defRPr>
             </a:pPr>
-            <a:r>
-              <a:t>Appveyor: </a:t>
-            </a:r>
           </a:p>
           <a:p>
             <a:pPr marL="0" indent="0" defTabSz="457200">
@@ -12204,13 +12216,7 @@
               </a:defRPr>
             </a:pPr>
             <a:r>
-              <a:rPr u="sng">
-                <a:solidFill>
-                  <a:schemeClr val="accent1"/>
-                </a:solidFill>
-                <a:hlinkClick r:id="rId5" invalidUrl="" action="" tgtFrame="" tooltip="" history="1" highlightClick="0" endSnd="0"/>
-              </a:rPr>
-              <a:t>https://www.appveyor.com/docs/appveyor-yml/</a:t>
+              <a:t>Appveyor: </a:t>
             </a:r>
           </a:p>
           <a:p>
@@ -12239,7 +12245,7 @@
                 </a:solidFill>
                 <a:hlinkClick r:id="rId6" invalidUrl="" action="" tgtFrame="" tooltip="" history="1" highlightClick="0" endSnd="0"/>
               </a:rPr>
-              <a:t>https://ci.appveyor.com/tools/encrypt</a:t>
+              <a:t>https://www.appveyor.com/docs/appveyor-yml/</a:t>
             </a:r>
           </a:p>
           <a:p>
@@ -12268,7 +12274,7 @@
                 </a:solidFill>
                 <a:hlinkClick r:id="rId7" invalidUrl="" action="" tgtFrame="" tooltip="" history="1" highlightClick="0" endSnd="0"/>
               </a:rPr>
-              <a:t>https://github.com/PowerShell/DscResource.Tests/blob/dev/AppVeyor.psm1</a:t>
+              <a:t>https://ci.appveyor.com/tools/encrypt</a:t>
             </a:r>
           </a:p>
           <a:p>
@@ -12290,6 +12296,15 @@
                 <a:sym typeface="Monaco"/>
               </a:defRPr>
             </a:pPr>
+            <a:r>
+              <a:rPr u="sng">
+                <a:solidFill>
+                  <a:schemeClr val="accent1"/>
+                </a:solidFill>
+                <a:hlinkClick r:id="rId8" invalidUrl="" action="" tgtFrame="" tooltip="" history="1" highlightClick="0" endSnd="0"/>
+              </a:rPr>
+              <a:t>https://github.com/PowerShell/DscResource.Tests/blob/dev/AppVeyor.psm1</a:t>
+            </a:r>
           </a:p>
           <a:p>
             <a:pPr marL="0" indent="0" defTabSz="457200">
@@ -12310,9 +12325,6 @@
                 <a:sym typeface="Monaco"/>
               </a:defRPr>
             </a:pPr>
-            <a:r>
-              <a:t>Devops:</a:t>
-            </a:r>
           </a:p>
           <a:p>
             <a:pPr marL="0" indent="0" defTabSz="457200">
@@ -12334,11 +12346,34 @@
               </a:defRPr>
             </a:pPr>
             <a:r>
+              <a:t>Devops:</a:t>
+            </a:r>
+          </a:p>
+          <a:p>
+            <a:pPr marL="0" indent="0" defTabSz="457200">
+              <a:spcBef>
+                <a:spcPts val="0"/>
+              </a:spcBef>
+              <a:buClrTx/>
+              <a:buSzTx/>
+              <a:buFontTx/>
+              <a:buNone/>
+              <a:defRPr sz="1500">
+                <a:solidFill>
+                  <a:srgbClr val="000000"/>
+                </a:solidFill>
+                <a:latin typeface="Monaco"/>
+                <a:ea typeface="Monaco"/>
+                <a:cs typeface="Monaco"/>
+                <a:sym typeface="Monaco"/>
+              </a:defRPr>
+            </a:pPr>
+            <a:r>
               <a:rPr u="sng">
                 <a:solidFill>
                   <a:schemeClr val="accent1"/>
                 </a:solidFill>
-                <a:hlinkClick r:id="rId8" invalidUrl="" action="" tgtFrame="" tooltip="" history="1" highlightClick="0" endSnd="0"/>
+                <a:hlinkClick r:id="rId9" invalidUrl="" action="" tgtFrame="" tooltip="" history="1" highlightClick="0" endSnd="0"/>
               </a:rPr>
               <a:t>https://xebialabs.com/periodic-table-of-devops-tools</a:t>
             </a:r>

</xml_diff>